<commit_message>
updated to lectrue 7
</commit_message>
<xml_diff>
--- a/docs/lectures/lecture_02/02_01_lecture_powerpoint.pptx
+++ b/docs/lectures/lecture_02/02_01_lecture_powerpoint.pptx
@@ -4509,7 +4509,7 @@
                       </a:pPr>
                       <a:r>
                         <a:rPr/>
-                        <a:t>mean_len_mm</a:t>
+                        <a:t>mean_length_mm</a:t>
                       </a:r>
                     </a:p>
                   </a:txBody>
@@ -4525,7 +4525,7 @@
                       </a:pPr>
                       <a:r>
                         <a:rPr/>
-                        <a:t>sd_len_mm</a:t>
+                        <a:t>sd_length_mm</a:t>
                       </a:r>
                     </a:p>
                   </a:txBody>
@@ -4541,7 +4541,7 @@
                       </a:pPr>
                       <a:r>
                         <a:rPr/>
-                        <a:t>min_len_mms</a:t>
+                        <a:t>min_length_mms</a:t>
                       </a:r>
                     </a:p>
                   </a:txBody>
@@ -4557,7 +4557,7 @@
                       </a:pPr>
                       <a:r>
                         <a:rPr/>
-                        <a:t>max_len_mm</a:t>
+                        <a:t>max_length_mm</a:t>
                       </a:r>
                     </a:p>
                   </a:txBody>
@@ -6400,7 +6400,7 @@
                 </a:solidFill>
                 <a:latin typeface="Courier"/>
               </a:rPr>
-              <a:t> len_mm)) </a:t>
+              <a:t> length_mm)) </a:t>
             </a:r>
             <a:r>
               <a:rPr>
@@ -7263,7 +7263,7 @@
                 </a:solidFill>
                 <a:latin typeface="Courier"/>
               </a:rPr>
-              <a:t> len_mm)) </a:t>
+              <a:t> length_mm)) </a:t>
             </a:r>
             <a:r>
               <a:rPr>
@@ -9714,7 +9714,7 @@
                 </a:solidFill>
                 <a:latin typeface="Courier"/>
               </a:rPr>
-              <a:t> len_mm, </a:t>
+              <a:t> length_mm, </a:t>
             </a:r>
             <a:r>
               <a:rPr>
@@ -12490,12 +12490,12 @@
               </a:rPr>
               <a:t>Rows: 48
 Columns: 6
-$ date    &lt;chr&gt; "3/20/25", "3/20/25", "3/20/25", "3/20/25", "3/20/25", "3/20/2…
-$ group   &lt;chr&gt; "cephalopods", "cephalopods", "cephalopods", "cephalopods", "c…
-$ n_s     &lt;chr&gt; "n", "n", "n", "n", "n", "n", "s", "s", "s", "s", "s", "s", "n…
-$ wind    &lt;chr&gt; "lee", "lee", "lee", "lee", "lee", "lee", "wind", "wind", "win…
-$ tree_no &lt;dbl&gt; 1, 1, 1, 1, 1, 1, 1, 1, 1, 1, 1, 1, 2, 2, 2, 2, 2, 2, 2, 2, 2,…
-$ len_mm  &lt;dbl&gt; 20, 21, 23, 25, 21, 16, 15, 16, 14, 17, 13, 15, 19, 18, 20, 23…</a:t>
+$ date      &lt;chr&gt; "3/20/25", "3/20/25", "3/20/25", "3/20/25", "3/20/25", "3/20…
+$ group     &lt;chr&gt; "cephalopods", "cephalopods", "cephalopods", "cephalopods", …
+$ n_s       &lt;chr&gt; "n", "n", "n", "n", "n", "n", "s", "s", "s", "s", "s", "s", …
+$ wind      &lt;chr&gt; "lee", "lee", "lee", "lee", "lee", "lee", "wind", "wind", "w…
+$ tree_no   &lt;dbl&gt; 1, 1, 1, 1, 1, 1, 1, 1, 1, 1, 1, 1, 2, 2, 2, 2, 2, 2, 2, 2, …
+$ length_mm &lt;dbl&gt; 20, 21, 23, 25, 21, 16, 15, 16, 14, 17, 13, 15, 19, 18, 20, …</a:t>
             </a:r>
           </a:p>
           <a:p>

</xml_diff>